<commit_message>
#27 Adjusted version number in pictures
</commit_message>
<xml_diff>
--- a/documentation/DD-API-2.0-resource-objects.pptx
+++ b/documentation/DD-API-2.0-resource-objects.pptx
@@ -224,7 +224,7 @@
           <a:p>
             <a:fld id="{C5B82782-F686-4554-930A-147097EB8850}" type="datetimeFigureOut">
               <a:rPr lang="en-GB" smtClean="0"/>
-              <a:t>08/11/2020</a:t>
+              <a:t>25/08/2021</a:t>
             </a:fld>
             <a:endParaRPr lang="en-GB" dirty="0"/>
           </a:p>
@@ -673,7 +673,7 @@
           <a:p>
             <a:fld id="{12F7E872-0053-49C4-B2E5-59B8432B4053}" type="datetimeFigureOut">
               <a:rPr lang="en-GB" smtClean="0"/>
-              <a:t>08/11/2020</a:t>
+              <a:t>25/08/2021</a:t>
             </a:fld>
             <a:endParaRPr lang="en-GB" dirty="0"/>
           </a:p>
@@ -843,7 +843,7 @@
           <a:p>
             <a:fld id="{12F7E872-0053-49C4-B2E5-59B8432B4053}" type="datetimeFigureOut">
               <a:rPr lang="en-GB" smtClean="0"/>
-              <a:t>08/11/2020</a:t>
+              <a:t>25/08/2021</a:t>
             </a:fld>
             <a:endParaRPr lang="en-GB" dirty="0"/>
           </a:p>
@@ -1023,7 +1023,7 @@
           <a:p>
             <a:fld id="{12F7E872-0053-49C4-B2E5-59B8432B4053}" type="datetimeFigureOut">
               <a:rPr lang="en-GB" smtClean="0"/>
-              <a:t>08/11/2020</a:t>
+              <a:t>25/08/2021</a:t>
             </a:fld>
             <a:endParaRPr lang="en-GB" dirty="0"/>
           </a:p>
@@ -1193,7 +1193,7 @@
           <a:p>
             <a:fld id="{12F7E872-0053-49C4-B2E5-59B8432B4053}" type="datetimeFigureOut">
               <a:rPr lang="en-GB" smtClean="0"/>
-              <a:t>08/11/2020</a:t>
+              <a:t>25/08/2021</a:t>
             </a:fld>
             <a:endParaRPr lang="en-GB" dirty="0"/>
           </a:p>
@@ -1439,7 +1439,7 @@
           <a:p>
             <a:fld id="{12F7E872-0053-49C4-B2E5-59B8432B4053}" type="datetimeFigureOut">
               <a:rPr lang="en-GB" smtClean="0"/>
-              <a:t>08/11/2020</a:t>
+              <a:t>25/08/2021</a:t>
             </a:fld>
             <a:endParaRPr lang="en-GB" dirty="0"/>
           </a:p>
@@ -1727,7 +1727,7 @@
           <a:p>
             <a:fld id="{12F7E872-0053-49C4-B2E5-59B8432B4053}" type="datetimeFigureOut">
               <a:rPr lang="en-GB" smtClean="0"/>
-              <a:t>08/11/2020</a:t>
+              <a:t>25/08/2021</a:t>
             </a:fld>
             <a:endParaRPr lang="en-GB" dirty="0"/>
           </a:p>
@@ -2154,7 +2154,7 @@
           <a:p>
             <a:fld id="{12F7E872-0053-49C4-B2E5-59B8432B4053}" type="datetimeFigureOut">
               <a:rPr lang="en-GB" smtClean="0"/>
-              <a:t>08/11/2020</a:t>
+              <a:t>25/08/2021</a:t>
             </a:fld>
             <a:endParaRPr lang="en-GB" dirty="0"/>
           </a:p>
@@ -2272,7 +2272,7 @@
           <a:p>
             <a:fld id="{12F7E872-0053-49C4-B2E5-59B8432B4053}" type="datetimeFigureOut">
               <a:rPr lang="en-GB" smtClean="0"/>
-              <a:t>08/11/2020</a:t>
+              <a:t>25/08/2021</a:t>
             </a:fld>
             <a:endParaRPr lang="en-GB" dirty="0"/>
           </a:p>
@@ -2367,7 +2367,7 @@
           <a:p>
             <a:fld id="{12F7E872-0053-49C4-B2E5-59B8432B4053}" type="datetimeFigureOut">
               <a:rPr lang="en-GB" smtClean="0"/>
-              <a:t>08/11/2020</a:t>
+              <a:t>25/08/2021</a:t>
             </a:fld>
             <a:endParaRPr lang="en-GB" dirty="0"/>
           </a:p>
@@ -2644,7 +2644,7 @@
           <a:p>
             <a:fld id="{12F7E872-0053-49C4-B2E5-59B8432B4053}" type="datetimeFigureOut">
               <a:rPr lang="en-GB" smtClean="0"/>
-              <a:t>08/11/2020</a:t>
+              <a:t>25/08/2021</a:t>
             </a:fld>
             <a:endParaRPr lang="en-GB" dirty="0"/>
           </a:p>
@@ -2897,7 +2897,7 @@
           <a:p>
             <a:fld id="{12F7E872-0053-49C4-B2E5-59B8432B4053}" type="datetimeFigureOut">
               <a:rPr lang="en-GB" smtClean="0"/>
-              <a:t>08/11/2020</a:t>
+              <a:t>25/08/2021</a:t>
             </a:fld>
             <a:endParaRPr lang="en-GB" dirty="0"/>
           </a:p>
@@ -3110,7 +3110,7 @@
           <a:p>
             <a:fld id="{12F7E872-0053-49C4-B2E5-59B8432B4053}" type="datetimeFigureOut">
               <a:rPr lang="en-GB" smtClean="0"/>
-              <a:t>08/11/2020</a:t>
+              <a:t>25/08/2021</a:t>
             </a:fld>
             <a:endParaRPr lang="en-GB" dirty="0"/>
           </a:p>
@@ -4082,7 +4082,7 @@
           <a:p>
             <a:r>
               <a:rPr lang="en-US" sz="1200" dirty="0"/>
-              <a:t>Digital Delta V2.0.1</a:t>
+              <a:t>Digital Delta V2.0.2</a:t>
             </a:r>
             <a:br>
               <a:rPr lang="en-US" sz="1200" dirty="0"/>
@@ -9517,7 +9517,7 @@
           <a:p>
             <a:r>
               <a:rPr lang="en-US" sz="1200" dirty="0"/>
-              <a:t>Digital Delta V2.0.1, DD-OPER</a:t>
+              <a:t>Digital Delta V2.0.2, DD-OPER</a:t>
             </a:r>
             <a:br>
               <a:rPr lang="en-US" sz="1200" dirty="0"/>

</xml_diff>